<commit_message>
Disclaimer : This is collected from Public Source on linkedin
</commit_message>
<xml_diff>
--- a/13-Jan-2022-5AM-Coding-Practice.pptx
+++ b/13-Jan-2022-5AM-Coding-Practice.pptx
@@ -104,6 +104,11 @@
       </a:defRPr>
     </a:lvl9pPr>
   </p:defaultTextStyle>
+  <p:extLst>
+    <p:ext uri="{EFAFB233-063F-42B5-8137-9DF3F51BA10A}">
+      <p15:sldGuideLst xmlns:p15="http://schemas.microsoft.com/office/powerpoint/2012/main"/>
+    </p:ext>
+  </p:extLst>
 </p:presentation>
 </file>
 
@@ -256,7 +261,7 @@
           <a:p>
             <a:fld id="{5FDA8818-53DE-4292-AA95-C29A38893CF1}" type="datetimeFigureOut">
               <a:rPr lang="en-IN" smtClean="0"/>
-              <a:t>13-01-2022</a:t>
+              <a:t>14-01-2022</a:t>
             </a:fld>
             <a:endParaRPr lang="en-IN"/>
           </a:p>
@@ -456,7 +461,7 @@
           <a:p>
             <a:fld id="{5FDA8818-53DE-4292-AA95-C29A38893CF1}" type="datetimeFigureOut">
               <a:rPr lang="en-IN" smtClean="0"/>
-              <a:t>13-01-2022</a:t>
+              <a:t>14-01-2022</a:t>
             </a:fld>
             <a:endParaRPr lang="en-IN"/>
           </a:p>
@@ -666,7 +671,7 @@
           <a:p>
             <a:fld id="{5FDA8818-53DE-4292-AA95-C29A38893CF1}" type="datetimeFigureOut">
               <a:rPr lang="en-IN" smtClean="0"/>
-              <a:t>13-01-2022</a:t>
+              <a:t>14-01-2022</a:t>
             </a:fld>
             <a:endParaRPr lang="en-IN"/>
           </a:p>
@@ -866,7 +871,7 @@
           <a:p>
             <a:fld id="{5FDA8818-53DE-4292-AA95-C29A38893CF1}" type="datetimeFigureOut">
               <a:rPr lang="en-IN" smtClean="0"/>
-              <a:t>13-01-2022</a:t>
+              <a:t>14-01-2022</a:t>
             </a:fld>
             <a:endParaRPr lang="en-IN"/>
           </a:p>
@@ -1142,7 +1147,7 @@
           <a:p>
             <a:fld id="{5FDA8818-53DE-4292-AA95-C29A38893CF1}" type="datetimeFigureOut">
               <a:rPr lang="en-IN" smtClean="0"/>
-              <a:t>13-01-2022</a:t>
+              <a:t>14-01-2022</a:t>
             </a:fld>
             <a:endParaRPr lang="en-IN"/>
           </a:p>
@@ -1410,7 +1415,7 @@
           <a:p>
             <a:fld id="{5FDA8818-53DE-4292-AA95-C29A38893CF1}" type="datetimeFigureOut">
               <a:rPr lang="en-IN" smtClean="0"/>
-              <a:t>13-01-2022</a:t>
+              <a:t>14-01-2022</a:t>
             </a:fld>
             <a:endParaRPr lang="en-IN"/>
           </a:p>
@@ -1825,7 +1830,7 @@
           <a:p>
             <a:fld id="{5FDA8818-53DE-4292-AA95-C29A38893CF1}" type="datetimeFigureOut">
               <a:rPr lang="en-IN" smtClean="0"/>
-              <a:t>13-01-2022</a:t>
+              <a:t>14-01-2022</a:t>
             </a:fld>
             <a:endParaRPr lang="en-IN"/>
           </a:p>
@@ -1967,7 +1972,7 @@
           <a:p>
             <a:fld id="{5FDA8818-53DE-4292-AA95-C29A38893CF1}" type="datetimeFigureOut">
               <a:rPr lang="en-IN" smtClean="0"/>
-              <a:t>13-01-2022</a:t>
+              <a:t>14-01-2022</a:t>
             </a:fld>
             <a:endParaRPr lang="en-IN"/>
           </a:p>
@@ -2080,7 +2085,7 @@
           <a:p>
             <a:fld id="{5FDA8818-53DE-4292-AA95-C29A38893CF1}" type="datetimeFigureOut">
               <a:rPr lang="en-IN" smtClean="0"/>
-              <a:t>13-01-2022</a:t>
+              <a:t>14-01-2022</a:t>
             </a:fld>
             <a:endParaRPr lang="en-IN"/>
           </a:p>
@@ -2393,7 +2398,7 @@
           <a:p>
             <a:fld id="{5FDA8818-53DE-4292-AA95-C29A38893CF1}" type="datetimeFigureOut">
               <a:rPr lang="en-IN" smtClean="0"/>
-              <a:t>13-01-2022</a:t>
+              <a:t>14-01-2022</a:t>
             </a:fld>
             <a:endParaRPr lang="en-IN"/>
           </a:p>
@@ -2682,7 +2687,7 @@
           <a:p>
             <a:fld id="{5FDA8818-53DE-4292-AA95-C29A38893CF1}" type="datetimeFigureOut">
               <a:rPr lang="en-IN" smtClean="0"/>
-              <a:t>13-01-2022</a:t>
+              <a:t>14-01-2022</a:t>
             </a:fld>
             <a:endParaRPr lang="en-IN"/>
           </a:p>
@@ -2925,7 +2930,7 @@
           <a:p>
             <a:fld id="{5FDA8818-53DE-4292-AA95-C29A38893CF1}" type="datetimeFigureOut">
               <a:rPr lang="en-IN" smtClean="0"/>
-              <a:t>13-01-2022</a:t>
+              <a:t>14-01-2022</a:t>
             </a:fld>
             <a:endParaRPr lang="en-IN"/>
           </a:p>
@@ -3409,7 +3414,7 @@
         <p:spPr>
           <a:xfrm>
             <a:off x="179462" y="871671"/>
-            <a:ext cx="11784650" cy="1815882"/>
+            <a:ext cx="11784650" cy="5170646"/>
           </a:xfrm>
           <a:prstGeom prst="rect">
             <a:avLst/>
@@ -3432,27 +3437,168 @@
           </a:p>
           <a:p>
             <a:r>
-              <a:rPr lang="en-US" sz="1200">
+              <a:rPr lang="en-US" sz="1200" dirty="0">
                 <a:latin typeface="Century Gothic" panose="020B0502020202020204" pitchFamily="34" charset="0"/>
               </a:rPr>
-              <a:t>Given an array with positive numbers and a positive target number, find all of its contiguous subarrays whose product is less than the target number.</a:t>
-            </a:r>
+              <a:t>Given an array with positive numbers and a positive target number, find all its </a:t>
+            </a:r>
+            <a:r>
+              <a:rPr lang="en-US" sz="1200" b="1" dirty="0">
+                <a:latin typeface="Century Gothic" panose="020B0502020202020204" pitchFamily="34" charset="0"/>
+              </a:rPr>
+              <a:t>contiguous subarrays whose product is less than the target number</a:t>
+            </a:r>
+            <a:r>
+              <a:rPr lang="en-US" sz="1200" dirty="0">
+                <a:latin typeface="Century Gothic" panose="020B0502020202020204" pitchFamily="34" charset="0"/>
+              </a:rPr>
+              <a:t>.</a:t>
+            </a:r>
+          </a:p>
+          <a:p>
+            <a:endParaRPr lang="en-US" sz="1400" dirty="0">
+              <a:latin typeface="Century Gothic" panose="020B0502020202020204" pitchFamily="34" charset="0"/>
+            </a:endParaRPr>
+          </a:p>
+          <a:p>
+            <a:r>
+              <a:rPr lang="en-IN" sz="1400" b="1" dirty="0">
+                <a:latin typeface="Nunito Sans" pitchFamily="2" charset="0"/>
+              </a:rPr>
+              <a:t>Example 1:</a:t>
+            </a:r>
+          </a:p>
+          <a:p>
+            <a:r>
+              <a:rPr lang="en-US" sz="1200" dirty="0">
+                <a:latin typeface="Century Gothic" panose="020B0502020202020204" pitchFamily="34" charset="0"/>
+              </a:rPr>
+              <a:t>Input: [2, 5, 3, 10], target=30 </a:t>
+            </a:r>
+          </a:p>
+          <a:p>
+            <a:r>
+              <a:rPr lang="en-US" sz="1200" dirty="0">
+                <a:latin typeface="Century Gothic" panose="020B0502020202020204" pitchFamily="34" charset="0"/>
+              </a:rPr>
+              <a:t>Output: [2], [5], [2, 5], [3], [5, 3], [10]</a:t>
+            </a:r>
+          </a:p>
+          <a:p>
+            <a:r>
+              <a:rPr lang="en-US" sz="1200" dirty="0">
+                <a:latin typeface="Century Gothic" panose="020B0502020202020204" pitchFamily="34" charset="0"/>
+              </a:rPr>
+              <a:t>Explanation: There are six contiguous subarrays whose product is less than the target.</a:t>
+            </a:r>
+          </a:p>
+          <a:p>
             <a:endParaRPr lang="en-US" sz="1200" dirty="0">
               <a:latin typeface="Century Gothic" panose="020B0502020202020204" pitchFamily="34" charset="0"/>
             </a:endParaRPr>
           </a:p>
           <a:p>
-            <a:endParaRPr lang="en-US" sz="1400" dirty="0">
+            <a:r>
+              <a:rPr lang="en-IN" sz="1400" b="1" dirty="0">
+                <a:latin typeface="Nunito Sans" pitchFamily="2" charset="0"/>
+              </a:rPr>
+              <a:t>Example 2:</a:t>
+            </a:r>
+          </a:p>
+          <a:p>
+            <a:r>
+              <a:rPr lang="en-US" sz="1200" dirty="0">
+                <a:latin typeface="Century Gothic" panose="020B0502020202020204" pitchFamily="34" charset="0"/>
+              </a:rPr>
+              <a:t>Input: [8, 2, 6, 5], target=50 </a:t>
+            </a:r>
+          </a:p>
+          <a:p>
+            <a:r>
+              <a:rPr lang="en-US" sz="1200" dirty="0">
+                <a:latin typeface="Century Gothic" panose="020B0502020202020204" pitchFamily="34" charset="0"/>
+              </a:rPr>
+              <a:t>Output: [8], [2], [8, 2], [6], [2, 6], [5], [6, 5] </a:t>
+            </a:r>
+          </a:p>
+          <a:p>
+            <a:r>
+              <a:rPr lang="en-US" sz="1200" dirty="0">
+                <a:latin typeface="Century Gothic" panose="020B0502020202020204" pitchFamily="34" charset="0"/>
+              </a:rPr>
+              <a:t>Explanation: There are seven contiguous subarrays whose product is less than the target.</a:t>
+            </a:r>
+          </a:p>
+          <a:p>
+            <a:endParaRPr lang="en-US" sz="1200" dirty="0">
               <a:latin typeface="Century Gothic" panose="020B0502020202020204" pitchFamily="34" charset="0"/>
             </a:endParaRPr>
           </a:p>
           <a:p>
-            <a:endParaRPr lang="en-US" sz="1400" dirty="0">
+            <a:r>
+              <a:rPr lang="en-US" sz="1200" dirty="0">
+                <a:latin typeface="Century Gothic" panose="020B0502020202020204" pitchFamily="34" charset="0"/>
+              </a:rPr>
+              <a:t>First intuition of this problem is , you are looking for contiguous subarray. So, sliding window concept can work here.</a:t>
+            </a:r>
+          </a:p>
+          <a:p>
+            <a:r>
+              <a:rPr lang="en-US" sz="1200" dirty="0">
+                <a:latin typeface="Century Gothic" panose="020B0502020202020204" pitchFamily="34" charset="0"/>
+              </a:rPr>
+              <a:t>But’s let’s understand that does this suffice to solve this problem?</a:t>
+            </a:r>
+          </a:p>
+          <a:p>
+            <a:endParaRPr lang="en-US" sz="1200" dirty="0">
               <a:latin typeface="Century Gothic" panose="020B0502020202020204" pitchFamily="34" charset="0"/>
             </a:endParaRPr>
           </a:p>
           <a:p>
-            <a:endParaRPr lang="en-US" sz="1400" dirty="0">
+            <a:r>
+              <a:rPr lang="en-US" sz="1200" dirty="0">
+                <a:latin typeface="Century Gothic" panose="020B0502020202020204" pitchFamily="34" charset="0"/>
+              </a:rPr>
+              <a:t>So, this sliding window help us to create the sub array from fixed starting point, but our requirement here is to move the starting position also.</a:t>
+            </a:r>
+          </a:p>
+          <a:p>
+            <a:r>
+              <a:rPr lang="en-US" sz="1200" dirty="0">
+                <a:latin typeface="Century Gothic" panose="020B0502020202020204" pitchFamily="34" charset="0"/>
+              </a:rPr>
+              <a:t>So, we need something to handle this start and end progress also in your approach, and it could be two pointer approach.</a:t>
+            </a:r>
+          </a:p>
+          <a:p>
+            <a:endParaRPr lang="en-US" sz="1200" dirty="0">
+              <a:latin typeface="Century Gothic" panose="020B0502020202020204" pitchFamily="34" charset="0"/>
+            </a:endParaRPr>
+          </a:p>
+          <a:p>
+            <a:r>
+              <a:rPr lang="en-US" sz="1400" b="1" dirty="0">
+                <a:solidFill>
+                  <a:srgbClr val="7030A0"/>
+                </a:solidFill>
+                <a:latin typeface="Century Gothic" panose="020B0502020202020204" pitchFamily="34" charset="0"/>
+              </a:rPr>
+              <a:t>=&gt;This problem follows the Sliding Window and the Two Pointers pattern for solution.</a:t>
+            </a:r>
+          </a:p>
+          <a:p>
+            <a:endParaRPr lang="en-US" sz="1200">
+              <a:latin typeface="Century Gothic" panose="020B0502020202020204" pitchFamily="34" charset="0"/>
+            </a:endParaRPr>
+          </a:p>
+          <a:p>
+            <a:endParaRPr lang="en-US" sz="1200" dirty="0">
+              <a:latin typeface="Century Gothic" panose="020B0502020202020204" pitchFamily="34" charset="0"/>
+            </a:endParaRPr>
+          </a:p>
+          <a:p>
+            <a:endParaRPr lang="en-IN" sz="1400" dirty="0">
               <a:latin typeface="Century Gothic" panose="020B0502020202020204" pitchFamily="34" charset="0"/>
             </a:endParaRPr>
           </a:p>

</xml_diff>